<commit_message>
added GT slide in week 9 ppt
</commit_message>
<xml_diff>
--- a/weekly_progress/week9.pptx
+++ b/weekly_progress/week9.pptx
@@ -10,6 +10,7 @@
     <p:sldId id="257" r:id="rId5"/>
     <p:sldId id="258" r:id="rId6"/>
     <p:sldId id="259" r:id="rId7"/>
+    <p:sldId id="260" r:id="rId8"/>
   </p:sldIdLst>
   <p:sldSz cx="9144000" cy="6858000"/>
   <p:notesSz cx="7559675" cy="10691812"/>
@@ -3386,35 +3387,7 @@
                 </a:uFill>
                 <a:latin typeface="Arial"/>
               </a:rPr>
-              <a:t>Click to </a:t>
-            </a:r>
-            <a:r>
-              <a:rPr b="0" lang="en-IN" sz="4400" spc="-1" strike="noStrike">
-                <a:solidFill>
-                  <a:srgbClr val="000000"/>
-                </a:solidFill>
-                <a:uFill>
-                  <a:solidFill>
-                    <a:srgbClr val="ffffff"/>
-                  </a:solidFill>
-                </a:uFill>
-                <a:latin typeface="Arial"/>
-              </a:rPr>
-              <a:t>edit the title </a:t>
-            </a:r>
-            <a:r>
-              <a:rPr b="0" lang="en-IN" sz="4400" spc="-1" strike="noStrike">
-                <a:solidFill>
-                  <a:srgbClr val="000000"/>
-                </a:solidFill>
-                <a:uFill>
-                  <a:solidFill>
-                    <a:srgbClr val="ffffff"/>
-                  </a:solidFill>
-                </a:uFill>
-                <a:latin typeface="Arial"/>
-              </a:rPr>
-              <a:t>text format</a:t>
+              <a:t>Click to edit the title text format</a:t>
             </a:r>
             <a:endParaRPr b="0" lang="en-IN" sz="4400" spc="-1" strike="noStrike">
               <a:solidFill>
@@ -3744,7 +3717,7 @@
         <p:spPr>
           <a:xfrm>
             <a:off x="0" y="0"/>
-            <a:ext cx="8685360" cy="789840"/>
+            <a:ext cx="8685000" cy="789480"/>
           </a:xfrm>
           <a:prstGeom prst="rect">
             <a:avLst/>
@@ -3930,7 +3903,7 @@
         <p:spPr>
           <a:xfrm>
             <a:off x="720000" y="1080000"/>
-            <a:ext cx="2687760" cy="2351520"/>
+            <a:ext cx="2687400" cy="2351160"/>
           </a:xfrm>
           <a:prstGeom prst="rect">
             <a:avLst/>
@@ -3953,7 +3926,7 @@
         <p:spPr>
           <a:xfrm>
             <a:off x="3993840" y="1008000"/>
-            <a:ext cx="2797920" cy="2448000"/>
+            <a:ext cx="2797560" cy="2447640"/>
           </a:xfrm>
           <a:prstGeom prst="rect">
             <a:avLst/>
@@ -3976,7 +3949,7 @@
         <p:spPr>
           <a:xfrm>
             <a:off x="648000" y="3546360"/>
-            <a:ext cx="3047760" cy="2285640"/>
+            <a:ext cx="3047400" cy="2285280"/>
           </a:xfrm>
           <a:prstGeom prst="rect">
             <a:avLst/>
@@ -3999,7 +3972,7 @@
         <p:spPr>
           <a:xfrm>
             <a:off x="3936240" y="3474360"/>
-            <a:ext cx="3047760" cy="2285640"/>
+            <a:ext cx="3047400" cy="2285280"/>
           </a:xfrm>
           <a:prstGeom prst="rect">
             <a:avLst/>
@@ -4011,14 +3984,14 @@
       </p:pic>
       <p:sp>
         <p:nvSpPr>
-          <p:cNvPr id="77" name="TextShape 2"/>
-          <p:cNvSpPr txBox="1"/>
+          <p:cNvPr id="77" name="CustomShape 2"/>
+          <p:cNvSpPr/>
           <p:nvPr/>
         </p:nvSpPr>
         <p:spPr>
           <a:xfrm>
             <a:off x="864000" y="6264000"/>
-            <a:ext cx="6738480" cy="346320"/>
+            <a:ext cx="6738120" cy="345960"/>
           </a:xfrm>
           <a:prstGeom prst="rect">
             <a:avLst/>
@@ -4028,6 +4001,12 @@
             <a:noFill/>
           </a:ln>
         </p:spPr>
+        <p:style>
+          <a:lnRef idx="0"/>
+          <a:fillRef idx="0"/>
+          <a:effectRef idx="0"/>
+          <a:fontRef idx="minor"/>
+        </p:style>
         <p:txBody>
           <a:bodyPr lIns="90000" rIns="90000" tIns="45000" bIns="45000"/>
           <a:p>
@@ -4117,7 +4096,7 @@
         <p:spPr>
           <a:xfrm>
             <a:off x="0" y="0"/>
-            <a:ext cx="8685360" cy="789840"/>
+            <a:ext cx="8685000" cy="789480"/>
           </a:xfrm>
           <a:prstGeom prst="rect">
             <a:avLst/>
@@ -4321,7 +4300,7 @@
         <p:spPr>
           <a:xfrm>
             <a:off x="504000" y="994680"/>
-            <a:ext cx="3089520" cy="2317320"/>
+            <a:ext cx="3089160" cy="2316960"/>
           </a:xfrm>
           <a:prstGeom prst="rect">
             <a:avLst/>
@@ -4344,7 +4323,7 @@
         <p:spPr>
           <a:xfrm>
             <a:off x="432000" y="3456000"/>
-            <a:ext cx="3168000" cy="2376000"/>
+            <a:ext cx="3167640" cy="2375640"/>
           </a:xfrm>
           <a:prstGeom prst="rect">
             <a:avLst/>
@@ -4367,7 +4346,7 @@
         <p:spPr>
           <a:xfrm>
             <a:off x="3888000" y="3384000"/>
-            <a:ext cx="3161520" cy="2371320"/>
+            <a:ext cx="3161160" cy="2370960"/>
           </a:xfrm>
           <a:prstGeom prst="rect">
             <a:avLst/>
@@ -4389,8 +4368,8 @@
         </p:blipFill>
         <p:spPr>
           <a:xfrm rot="21585000">
-            <a:off x="3882960" y="1014480"/>
-            <a:ext cx="3024000" cy="2268000"/>
+            <a:off x="3882600" y="1014120"/>
+            <a:ext cx="3023640" cy="2267640"/>
           </a:xfrm>
           <a:prstGeom prst="rect">
             <a:avLst/>
@@ -4402,14 +4381,14 @@
       </p:pic>
       <p:sp>
         <p:nvSpPr>
-          <p:cNvPr id="83" name="TextShape 2"/>
-          <p:cNvSpPr txBox="1"/>
+          <p:cNvPr id="83" name="CustomShape 2"/>
+          <p:cNvSpPr/>
           <p:nvPr/>
         </p:nvSpPr>
         <p:spPr>
           <a:xfrm>
             <a:off x="504000" y="6061680"/>
-            <a:ext cx="4792320" cy="346320"/>
+            <a:ext cx="4791960" cy="345960"/>
           </a:xfrm>
           <a:prstGeom prst="rect">
             <a:avLst/>
@@ -4419,6 +4398,12 @@
             <a:noFill/>
           </a:ln>
         </p:spPr>
+        <p:style>
+          <a:lnRef idx="0"/>
+          <a:fillRef idx="0"/>
+          <a:effectRef idx="0"/>
+          <a:fontRef idx="minor"/>
+        </p:style>
         <p:txBody>
           <a:bodyPr lIns="90000" rIns="90000" tIns="45000" bIns="45000"/>
           <a:p>
@@ -4508,7 +4493,7 @@
         <p:spPr>
           <a:xfrm>
             <a:off x="0" y="0"/>
-            <a:ext cx="8685360" cy="789840"/>
+            <a:ext cx="8685000" cy="789480"/>
           </a:xfrm>
           <a:prstGeom prst="rect">
             <a:avLst/>
@@ -4545,7 +4530,7 @@
                 <a:latin typeface="Times New Roman"/>
                 <a:ea typeface="Times New Roman"/>
               </a:rPr>
-              <a:t>Future approaches :</a:t>
+              <a:t>GT of segmentation available  :</a:t>
             </a:r>
             <a:endParaRPr b="0" lang="en-IN" sz="1800" spc="-1" strike="noStrike">
               <a:solidFill>
@@ -4578,226 +4563,7 @@
                 <a:latin typeface="Times New Roman"/>
                 <a:ea typeface="Times New Roman"/>
               </a:rPr>
-              <a:t>1. Basic segnet model (FCN based) to segment the iris.</a:t>
-            </a:r>
-            <a:endParaRPr b="0" lang="en-IN" sz="1800" spc="-1" strike="noStrike">
-              <a:solidFill>
-                <a:srgbClr val="000000"/>
-              </a:solidFill>
-              <a:uFill>
-                <a:solidFill>
-                  <a:srgbClr val="ffffff"/>
-                </a:solidFill>
-              </a:uFill>
-              <a:latin typeface="Arial"/>
-            </a:endParaRPr>
-          </a:p>
-          <a:p>
-            <a:pPr>
-              <a:lnSpc>
-                <a:spcPct val="100000"/>
-              </a:lnSpc>
-            </a:pPr>
-            <a:r>
-              <a:rPr b="0" lang="en-IN" sz="3000" spc="-1" strike="noStrike">
-                <a:solidFill>
-                  <a:srgbClr val="2c0ee0"/>
-                </a:solidFill>
-                <a:uFill>
-                  <a:solidFill>
-                    <a:srgbClr val="ffffff"/>
-                  </a:solidFill>
-                </a:uFill>
-                <a:latin typeface="Times New Roman"/>
-                <a:ea typeface="Times New Roman"/>
-              </a:rPr>
-              <a:t>2. Supervised eye segmentation with scalera and correct the view angle by projection, as we know for staight view iris should be in middle in the eye.</a:t>
-            </a:r>
-            <a:endParaRPr b="0" lang="en-IN" sz="1800" spc="-1" strike="noStrike">
-              <a:solidFill>
-                <a:srgbClr val="000000"/>
-              </a:solidFill>
-              <a:uFill>
-                <a:solidFill>
-                  <a:srgbClr val="ffffff"/>
-                </a:solidFill>
-              </a:uFill>
-              <a:latin typeface="Arial"/>
-            </a:endParaRPr>
-          </a:p>
-          <a:p>
-            <a:pPr>
-              <a:lnSpc>
-                <a:spcPct val="100000"/>
-              </a:lnSpc>
-            </a:pPr>
-            <a:r>
-              <a:rPr b="0" lang="en-IN" sz="3000" spc="-1" strike="noStrike">
-                <a:solidFill>
-                  <a:srgbClr val="2c0ee0"/>
-                </a:solidFill>
-                <a:uFill>
-                  <a:solidFill>
-                    <a:srgbClr val="ffffff"/>
-                  </a:solidFill>
-                </a:uFill>
-                <a:latin typeface="Times New Roman"/>
-                <a:ea typeface="Times New Roman"/>
-              </a:rPr>
-              <a:t>3. Unsupervied way to segment eye first and check the possibilities for iris segmentation also.</a:t>
-            </a:r>
-            <a:endParaRPr b="0" lang="en-IN" sz="1800" spc="-1" strike="noStrike">
-              <a:solidFill>
-                <a:srgbClr val="000000"/>
-              </a:solidFill>
-              <a:uFill>
-                <a:solidFill>
-                  <a:srgbClr val="ffffff"/>
-                </a:solidFill>
-              </a:uFill>
-              <a:latin typeface="Arial"/>
-            </a:endParaRPr>
-          </a:p>
-          <a:p>
-            <a:pPr>
-              <a:lnSpc>
-                <a:spcPct val="100000"/>
-              </a:lnSpc>
-            </a:pPr>
-            <a:endParaRPr b="0" lang="en-IN" sz="1800" spc="-1" strike="noStrike">
-              <a:solidFill>
-                <a:srgbClr val="000000"/>
-              </a:solidFill>
-              <a:uFill>
-                <a:solidFill>
-                  <a:srgbClr val="ffffff"/>
-                </a:solidFill>
-              </a:uFill>
-              <a:latin typeface="Arial"/>
-            </a:endParaRPr>
-          </a:p>
-          <a:p>
-            <a:pPr>
-              <a:lnSpc>
-                <a:spcPct val="100000"/>
-              </a:lnSpc>
-            </a:pPr>
-            <a:r>
-              <a:rPr b="0" lang="en-IN" sz="3000" spc="-1" strike="noStrike">
-                <a:solidFill>
-                  <a:srgbClr val="2c0ee0"/>
-                </a:solidFill>
-                <a:uFill>
-                  <a:solidFill>
-                    <a:srgbClr val="ffffff"/>
-                  </a:solidFill>
-                </a:uFill>
-                <a:latin typeface="Times New Roman"/>
-                <a:ea typeface="Times New Roman"/>
-              </a:rPr>
-              <a:t>Where are we : </a:t>
-            </a:r>
-            <a:endParaRPr b="0" lang="en-IN" sz="1800" spc="-1" strike="noStrike">
-              <a:solidFill>
-                <a:srgbClr val="000000"/>
-              </a:solidFill>
-              <a:uFill>
-                <a:solidFill>
-                  <a:srgbClr val="ffffff"/>
-                </a:solidFill>
-              </a:uFill>
-              <a:latin typeface="Arial"/>
-            </a:endParaRPr>
-          </a:p>
-          <a:p>
-            <a:pPr>
-              <a:lnSpc>
-                <a:spcPct val="100000"/>
-              </a:lnSpc>
-            </a:pPr>
-            <a:endParaRPr b="0" lang="en-IN" sz="1800" spc="-1" strike="noStrike">
-              <a:solidFill>
-                <a:srgbClr val="000000"/>
-              </a:solidFill>
-              <a:uFill>
-                <a:solidFill>
-                  <a:srgbClr val="ffffff"/>
-                </a:solidFill>
-              </a:uFill>
-              <a:latin typeface="Arial"/>
-            </a:endParaRPr>
-          </a:p>
-          <a:p>
-            <a:pPr>
-              <a:lnSpc>
-                <a:spcPct val="100000"/>
-              </a:lnSpc>
-            </a:pPr>
-            <a:r>
-              <a:rPr b="0" lang="en-IN" sz="3000" spc="-1" strike="noStrike">
-                <a:solidFill>
-                  <a:srgbClr val="2c0ee0"/>
-                </a:solidFill>
-                <a:uFill>
-                  <a:solidFill>
-                    <a:srgbClr val="ffffff"/>
-                  </a:solidFill>
-                </a:uFill>
-                <a:latin typeface="Times New Roman"/>
-                <a:ea typeface="Times New Roman"/>
-              </a:rPr>
-              <a:t>Writing the own code of segnet from scratch in tensorflow. It should be done in 2 to 3 days. </a:t>
-            </a:r>
-            <a:endParaRPr b="0" lang="en-IN" sz="1800" spc="-1" strike="noStrike">
-              <a:solidFill>
-                <a:srgbClr val="000000"/>
-              </a:solidFill>
-              <a:uFill>
-                <a:solidFill>
-                  <a:srgbClr val="ffffff"/>
-                </a:solidFill>
-              </a:uFill>
-              <a:latin typeface="Arial"/>
-            </a:endParaRPr>
-          </a:p>
-          <a:p>
-            <a:pPr>
-              <a:lnSpc>
-                <a:spcPct val="100000"/>
-              </a:lnSpc>
-            </a:pPr>
-            <a:endParaRPr b="0" lang="en-IN" sz="1800" spc="-1" strike="noStrike">
-              <a:solidFill>
-                <a:srgbClr val="000000"/>
-              </a:solidFill>
-              <a:uFill>
-                <a:solidFill>
-                  <a:srgbClr val="ffffff"/>
-                </a:solidFill>
-              </a:uFill>
-              <a:latin typeface="Arial"/>
-            </a:endParaRPr>
-          </a:p>
-          <a:p>
-            <a:pPr>
-              <a:lnSpc>
-                <a:spcPct val="100000"/>
-              </a:lnSpc>
-            </a:pPr>
-            <a:r>
-              <a:rPr b="0" lang="en-IN" sz="3000" spc="-1" strike="noStrike">
-                <a:solidFill>
-                  <a:srgbClr val="2c0ee0"/>
-                </a:solidFill>
-                <a:uFill>
-                  <a:solidFill>
-                    <a:srgbClr val="ffffff"/>
-                  </a:solidFill>
-                </a:uFill>
-                <a:latin typeface="Times New Roman"/>
-                <a:ea typeface="Times New Roman"/>
-              </a:rPr>
-              <a:t>Start studying abou unsupervised deep learning.      </a:t>
+              <a:t>      </a:t>
             </a:r>
             <a:endParaRPr b="0" lang="en-IN" sz="1800" spc="-1" strike="noStrike">
               <a:solidFill>
@@ -4999,7 +4765,7 @@
         <p:spPr>
           <a:xfrm>
             <a:off x="288000" y="4597920"/>
-            <a:ext cx="8664840" cy="1881360"/>
+            <a:ext cx="8664480" cy="1881000"/>
           </a:xfrm>
           <a:prstGeom prst="rect">
             <a:avLst/>
@@ -5015,6 +4781,332 @@
           <a:effectRef idx="0"/>
           <a:fontRef idx="minor"/>
         </p:style>
+      </p:sp>
+      <p:sp>
+        <p:nvSpPr>
+          <p:cNvPr id="86" name="TextShape 3"/>
+          <p:cNvSpPr txBox="1"/>
+          <p:nvPr/>
+        </p:nvSpPr>
+        <p:spPr>
+          <a:xfrm>
+            <a:off x="360000" y="805320"/>
+            <a:ext cx="7204680" cy="2649960"/>
+          </a:xfrm>
+          <a:prstGeom prst="rect">
+            <a:avLst/>
+          </a:prstGeom>
+          <a:noFill/>
+          <a:ln>
+            <a:noFill/>
+          </a:ln>
+        </p:spPr>
+        <p:txBody>
+          <a:bodyPr lIns="90000" rIns="90000" tIns="45000" bIns="45000"/>
+          <a:p>
+            <a:r>
+              <a:rPr b="0" lang="en-IN" sz="1800" spc="-1" strike="noStrike">
+                <a:solidFill>
+                  <a:srgbClr val="000000"/>
+                </a:solidFill>
+                <a:uFill>
+                  <a:solidFill>
+                    <a:srgbClr val="ffffff"/>
+                  </a:solidFill>
+                </a:uFill>
+                <a:latin typeface="Arial"/>
+                <a:hlinkClick r:id="rId1"/>
+              </a:rPr>
+              <a:t>http://islab.hh.se/mediawiki/index.php/Iris_Segmentation_Groundtruth</a:t>
+            </a:r>
+            <a:endParaRPr b="0" lang="en-IN" sz="1800" spc="-1" strike="noStrike">
+              <a:solidFill>
+                <a:srgbClr val="000000"/>
+              </a:solidFill>
+              <a:uFill>
+                <a:solidFill>
+                  <a:srgbClr val="ffffff"/>
+                </a:solidFill>
+              </a:uFill>
+              <a:latin typeface="Arial"/>
+            </a:endParaRPr>
+          </a:p>
+          <a:p>
+            <a:endParaRPr b="0" lang="en-IN" sz="1800" spc="-1" strike="noStrike">
+              <a:solidFill>
+                <a:srgbClr val="000000"/>
+              </a:solidFill>
+              <a:uFill>
+                <a:solidFill>
+                  <a:srgbClr val="ffffff"/>
+                </a:solidFill>
+              </a:uFill>
+              <a:latin typeface="Arial"/>
+            </a:endParaRPr>
+          </a:p>
+          <a:p>
+            <a:endParaRPr b="0" lang="en-IN" sz="1800" spc="-1" strike="noStrike">
+              <a:solidFill>
+                <a:srgbClr val="000000"/>
+              </a:solidFill>
+              <a:uFill>
+                <a:solidFill>
+                  <a:srgbClr val="ffffff"/>
+                </a:solidFill>
+              </a:uFill>
+              <a:latin typeface="Arial"/>
+            </a:endParaRPr>
+          </a:p>
+          <a:p>
+            <a:r>
+              <a:rPr b="0" lang="en-IN" sz="1800" spc="-1" strike="noStrike">
+                <a:solidFill>
+                  <a:srgbClr val="000000"/>
+                </a:solidFill>
+                <a:uFill>
+                  <a:solidFill>
+                    <a:srgbClr val="ffffff"/>
+                  </a:solidFill>
+                </a:uFill>
+                <a:latin typeface="Arial"/>
+              </a:rPr>
+              <a:t>The EP dataset contains ground truth data of:</a:t>
+            </a:r>
+            <a:endParaRPr b="0" lang="en-IN" sz="1800" spc="-1" strike="noStrike">
+              <a:solidFill>
+                <a:srgbClr val="000000"/>
+              </a:solidFill>
+              <a:uFill>
+                <a:solidFill>
+                  <a:srgbClr val="ffffff"/>
+                </a:solidFill>
+              </a:uFill>
+              <a:latin typeface="Arial"/>
+            </a:endParaRPr>
+          </a:p>
+          <a:p>
+            <a:endParaRPr b="0" lang="en-IN" sz="1800" spc="-1" strike="noStrike">
+              <a:solidFill>
+                <a:srgbClr val="000000"/>
+              </a:solidFill>
+              <a:uFill>
+                <a:solidFill>
+                  <a:srgbClr val="ffffff"/>
+                </a:solidFill>
+              </a:uFill>
+              <a:latin typeface="Arial"/>
+            </a:endParaRPr>
+          </a:p>
+          <a:p>
+            <a:pPr marL="216000" indent="-216000">
+              <a:buClr>
+                <a:srgbClr val="000000"/>
+              </a:buClr>
+              <a:buSzPct val="45000"/>
+              <a:buFont typeface="Wingdings" charset="2"/>
+              <a:buChar char=""/>
+            </a:pPr>
+            <a:r>
+              <a:rPr b="0" lang="en-IN" sz="1800" spc="-1" strike="noStrike">
+                <a:solidFill>
+                  <a:srgbClr val="000000"/>
+                </a:solidFill>
+                <a:uFill>
+                  <a:solidFill>
+                    <a:srgbClr val="ffffff"/>
+                  </a:solidFill>
+                </a:uFill>
+                <a:latin typeface="Arial"/>
+              </a:rPr>
+              <a:t>    </a:t>
+            </a:r>
+            <a:r>
+              <a:rPr b="0" lang="en-IN" sz="1800" spc="-1" strike="noStrike">
+                <a:solidFill>
+                  <a:srgbClr val="000000"/>
+                </a:solidFill>
+                <a:uFill>
+                  <a:solidFill>
+                    <a:srgbClr val="ffffff"/>
+                  </a:solidFill>
+                </a:uFill>
+                <a:latin typeface="Arial"/>
+              </a:rPr>
+              <a:t>Casia Iris v4 Interval Database (2639 iris images)</a:t>
+            </a:r>
+            <a:endParaRPr b="0" lang="en-IN" sz="1800" spc="-1" strike="noStrike">
+              <a:solidFill>
+                <a:srgbClr val="000000"/>
+              </a:solidFill>
+              <a:uFill>
+                <a:solidFill>
+                  <a:srgbClr val="ffffff"/>
+                </a:solidFill>
+              </a:uFill>
+              <a:latin typeface="Arial"/>
+            </a:endParaRPr>
+          </a:p>
+          <a:p>
+            <a:pPr marL="216000" indent="-216000">
+              <a:buClr>
+                <a:srgbClr val="000000"/>
+              </a:buClr>
+              <a:buSzPct val="45000"/>
+              <a:buFont typeface="Wingdings" charset="2"/>
+              <a:buChar char=""/>
+            </a:pPr>
+            <a:r>
+              <a:rPr b="0" lang="en-IN" sz="1800" spc="-1" strike="noStrike">
+                <a:solidFill>
+                  <a:srgbClr val="000000"/>
+                </a:solidFill>
+                <a:uFill>
+                  <a:solidFill>
+                    <a:srgbClr val="ffffff"/>
+                  </a:solidFill>
+                </a:uFill>
+                <a:latin typeface="Arial"/>
+              </a:rPr>
+              <a:t>    </a:t>
+            </a:r>
+            <a:r>
+              <a:rPr b="0" lang="en-IN" sz="1800" spc="-1" strike="noStrike">
+                <a:solidFill>
+                  <a:srgbClr val="000000"/>
+                </a:solidFill>
+                <a:uFill>
+                  <a:solidFill>
+                    <a:srgbClr val="ffffff"/>
+                  </a:solidFill>
+                </a:uFill>
+                <a:latin typeface="Arial"/>
+              </a:rPr>
+              <a:t>IIT Delhi Iris Database version 1.0 (2240 iris images)</a:t>
+            </a:r>
+            <a:endParaRPr b="0" lang="en-IN" sz="1800" spc="-1" strike="noStrike">
+              <a:solidFill>
+                <a:srgbClr val="000000"/>
+              </a:solidFill>
+              <a:uFill>
+                <a:solidFill>
+                  <a:srgbClr val="ffffff"/>
+                </a:solidFill>
+              </a:uFill>
+              <a:latin typeface="Arial"/>
+            </a:endParaRPr>
+          </a:p>
+          <a:p>
+            <a:pPr marL="216000" indent="-216000">
+              <a:buClr>
+                <a:srgbClr val="000000"/>
+              </a:buClr>
+              <a:buSzPct val="45000"/>
+              <a:buFont typeface="Wingdings" charset="2"/>
+              <a:buChar char=""/>
+            </a:pPr>
+            <a:r>
+              <a:rPr b="0" lang="en-IN" sz="1800" spc="-1" strike="noStrike">
+                <a:solidFill>
+                  <a:srgbClr val="000000"/>
+                </a:solidFill>
+                <a:uFill>
+                  <a:solidFill>
+                    <a:srgbClr val="ffffff"/>
+                  </a:solidFill>
+                </a:uFill>
+                <a:latin typeface="Arial"/>
+              </a:rPr>
+              <a:t>    </a:t>
+            </a:r>
+            <a:r>
+              <a:rPr b="0" lang="en-IN" sz="1800" spc="-1" strike="noStrike">
+                <a:solidFill>
+                  <a:srgbClr val="000000"/>
+                </a:solidFill>
+                <a:uFill>
+                  <a:solidFill>
+                    <a:srgbClr val="ffffff"/>
+                  </a:solidFill>
+                </a:uFill>
+                <a:latin typeface="Arial"/>
+              </a:rPr>
+              <a:t>Notre Dame IRIS-0405 Database (837 iris images)</a:t>
+            </a:r>
+            <a:endParaRPr b="0" lang="en-IN" sz="1800" spc="-1" strike="noStrike">
+              <a:solidFill>
+                <a:srgbClr val="000000"/>
+              </a:solidFill>
+              <a:uFill>
+                <a:solidFill>
+                  <a:srgbClr val="ffffff"/>
+                </a:solidFill>
+              </a:uFill>
+              <a:latin typeface="Arial"/>
+            </a:endParaRPr>
+          </a:p>
+          <a:p>
+            <a:pPr marL="216000" indent="-216000">
+              <a:buClr>
+                <a:srgbClr val="000000"/>
+              </a:buClr>
+              <a:buSzPct val="45000"/>
+              <a:buFont typeface="Wingdings" charset="2"/>
+              <a:buChar char=""/>
+            </a:pPr>
+            <a:r>
+              <a:rPr b="0" lang="en-IN" sz="1800" spc="-1" strike="noStrike">
+                <a:solidFill>
+                  <a:srgbClr val="000000"/>
+                </a:solidFill>
+                <a:uFill>
+                  <a:solidFill>
+                    <a:srgbClr val="ffffff"/>
+                  </a:solidFill>
+                </a:uFill>
+                <a:latin typeface="Arial"/>
+              </a:rPr>
+              <a:t>    </a:t>
+            </a:r>
+            <a:r>
+              <a:rPr b="0" lang="en-IN" sz="1800" spc="-1" strike="noStrike">
+                <a:solidFill>
+                  <a:srgbClr val="000000"/>
+                </a:solidFill>
+                <a:uFill>
+                  <a:solidFill>
+                    <a:srgbClr val="ffffff"/>
+                  </a:solidFill>
+                </a:uFill>
+                <a:latin typeface="Arial"/>
+              </a:rPr>
+              <a:t>UBIRIS v2 Iris Database (2250 iris images)</a:t>
+            </a:r>
+            <a:endParaRPr b="0" lang="en-IN" sz="1800" spc="-1" strike="noStrike">
+              <a:solidFill>
+                <a:srgbClr val="000000"/>
+              </a:solidFill>
+              <a:uFill>
+                <a:solidFill>
+                  <a:srgbClr val="ffffff"/>
+                </a:solidFill>
+              </a:uFill>
+              <a:latin typeface="Arial"/>
+            </a:endParaRPr>
+          </a:p>
+          <a:p>
+            <a:endParaRPr b="0" lang="en-IN" sz="1800" spc="-1" strike="noStrike">
+              <a:solidFill>
+                <a:srgbClr val="000000"/>
+              </a:solidFill>
+              <a:uFill>
+                <a:solidFill>
+                  <a:srgbClr val="ffffff"/>
+                </a:solidFill>
+              </a:uFill>
+              <a:latin typeface="Arial"/>
+            </a:endParaRPr>
+          </a:p>
+        </p:txBody>
       </p:sp>
     </p:spTree>
   </p:cSld>
@@ -5065,29 +5157,523 @@
           <a:chExt cx="0" cy="0"/>
         </a:xfrm>
       </p:grpSpPr>
-      <p:pic>
-        <p:nvPicPr>
-          <p:cNvPr id="86" name="Google Shape;178;p13" descr=""/>
-          <p:cNvPicPr/>
+      <p:sp>
+        <p:nvSpPr>
+          <p:cNvPr id="87" name="CustomShape 1"/>
+          <p:cNvSpPr/>
           <p:nvPr/>
-        </p:nvPicPr>
-        <p:blipFill>
-          <a:blip r:embed="rId1"/>
-          <a:stretch/>
-        </p:blipFill>
-        <p:spPr>
-          <a:xfrm>
-            <a:off x="2205000" y="1652760"/>
-            <a:ext cx="4732560" cy="3551400"/>
-          </a:xfrm>
-          <a:prstGeom prst="rect">
-            <a:avLst/>
-          </a:prstGeom>
+        </p:nvSpPr>
+        <p:spPr>
+          <a:xfrm>
+            <a:off x="0" y="0"/>
+            <a:ext cx="8685000" cy="789480"/>
+          </a:xfrm>
+          <a:prstGeom prst="rect">
+            <a:avLst/>
+          </a:prstGeom>
+          <a:noFill/>
           <a:ln>
             <a:noFill/>
           </a:ln>
         </p:spPr>
-      </p:pic>
+        <p:style>
+          <a:lnRef idx="0"/>
+          <a:fillRef idx="0"/>
+          <a:effectRef idx="0"/>
+          <a:fontRef idx="minor"/>
+        </p:style>
+        <p:txBody>
+          <a:bodyPr lIns="90000" rIns="90000" tIns="91440" bIns="91440"/>
+          <a:p>
+            <a:pPr>
+              <a:lnSpc>
+                <a:spcPct val="100000"/>
+              </a:lnSpc>
+            </a:pPr>
+            <a:r>
+              <a:rPr b="0" lang="en-IN" sz="3000" spc="-1" strike="noStrike">
+                <a:solidFill>
+                  <a:srgbClr val="2c0ee0"/>
+                </a:solidFill>
+                <a:uFill>
+                  <a:solidFill>
+                    <a:srgbClr val="ffffff"/>
+                  </a:solidFill>
+                </a:uFill>
+                <a:latin typeface="Times New Roman"/>
+                <a:ea typeface="Times New Roman"/>
+              </a:rPr>
+              <a:t>Future approaches :</a:t>
+            </a:r>
+            <a:endParaRPr b="0" lang="en-IN" sz="1800" spc="-1" strike="noStrike">
+              <a:solidFill>
+                <a:srgbClr val="000000"/>
+              </a:solidFill>
+              <a:uFill>
+                <a:solidFill>
+                  <a:srgbClr val="ffffff"/>
+                </a:solidFill>
+              </a:uFill>
+              <a:latin typeface="Arial"/>
+            </a:endParaRPr>
+          </a:p>
+          <a:p>
+            <a:pPr>
+              <a:lnSpc>
+                <a:spcPct val="100000"/>
+              </a:lnSpc>
+            </a:pPr>
+            <a:r>
+              <a:rPr b="0" lang="en-IN" sz="3000" spc="-1" strike="noStrike">
+                <a:solidFill>
+                  <a:srgbClr val="2c0ee0"/>
+                </a:solidFill>
+                <a:uFill>
+                  <a:solidFill>
+                    <a:srgbClr val="ffffff"/>
+                  </a:solidFill>
+                </a:uFill>
+                <a:latin typeface="Times New Roman"/>
+                <a:ea typeface="Times New Roman"/>
+              </a:rPr>
+              <a:t>1. Basic segnet model (FCN based) to segment the iris.</a:t>
+            </a:r>
+            <a:endParaRPr b="0" lang="en-IN" sz="1800" spc="-1" strike="noStrike">
+              <a:solidFill>
+                <a:srgbClr val="000000"/>
+              </a:solidFill>
+              <a:uFill>
+                <a:solidFill>
+                  <a:srgbClr val="ffffff"/>
+                </a:solidFill>
+              </a:uFill>
+              <a:latin typeface="Arial"/>
+            </a:endParaRPr>
+          </a:p>
+          <a:p>
+            <a:pPr>
+              <a:lnSpc>
+                <a:spcPct val="100000"/>
+              </a:lnSpc>
+            </a:pPr>
+            <a:r>
+              <a:rPr b="0" lang="en-IN" sz="3000" spc="-1" strike="noStrike">
+                <a:solidFill>
+                  <a:srgbClr val="2c0ee0"/>
+                </a:solidFill>
+                <a:uFill>
+                  <a:solidFill>
+                    <a:srgbClr val="ffffff"/>
+                  </a:solidFill>
+                </a:uFill>
+                <a:latin typeface="Times New Roman"/>
+                <a:ea typeface="Times New Roman"/>
+              </a:rPr>
+              <a:t>2. Supervised eye segmentation with scalera and correct the view angle by projection, as we know for staight view iris should be in middle in the eye.</a:t>
+            </a:r>
+            <a:endParaRPr b="0" lang="en-IN" sz="1800" spc="-1" strike="noStrike">
+              <a:solidFill>
+                <a:srgbClr val="000000"/>
+              </a:solidFill>
+              <a:uFill>
+                <a:solidFill>
+                  <a:srgbClr val="ffffff"/>
+                </a:solidFill>
+              </a:uFill>
+              <a:latin typeface="Arial"/>
+            </a:endParaRPr>
+          </a:p>
+          <a:p>
+            <a:pPr>
+              <a:lnSpc>
+                <a:spcPct val="100000"/>
+              </a:lnSpc>
+            </a:pPr>
+            <a:r>
+              <a:rPr b="0" lang="en-IN" sz="3000" spc="-1" strike="noStrike">
+                <a:solidFill>
+                  <a:srgbClr val="2c0ee0"/>
+                </a:solidFill>
+                <a:uFill>
+                  <a:solidFill>
+                    <a:srgbClr val="ffffff"/>
+                  </a:solidFill>
+                </a:uFill>
+                <a:latin typeface="Times New Roman"/>
+                <a:ea typeface="Times New Roman"/>
+              </a:rPr>
+              <a:t>3. Unsupervied way to segment eye first and check the possibilities for iris segmentation also.</a:t>
+            </a:r>
+            <a:endParaRPr b="0" lang="en-IN" sz="1800" spc="-1" strike="noStrike">
+              <a:solidFill>
+                <a:srgbClr val="000000"/>
+              </a:solidFill>
+              <a:uFill>
+                <a:solidFill>
+                  <a:srgbClr val="ffffff"/>
+                </a:solidFill>
+              </a:uFill>
+              <a:latin typeface="Arial"/>
+            </a:endParaRPr>
+          </a:p>
+          <a:p>
+            <a:pPr>
+              <a:lnSpc>
+                <a:spcPct val="100000"/>
+              </a:lnSpc>
+            </a:pPr>
+            <a:endParaRPr b="0" lang="en-IN" sz="1800" spc="-1" strike="noStrike">
+              <a:solidFill>
+                <a:srgbClr val="000000"/>
+              </a:solidFill>
+              <a:uFill>
+                <a:solidFill>
+                  <a:srgbClr val="ffffff"/>
+                </a:solidFill>
+              </a:uFill>
+              <a:latin typeface="Arial"/>
+            </a:endParaRPr>
+          </a:p>
+          <a:p>
+            <a:pPr>
+              <a:lnSpc>
+                <a:spcPct val="100000"/>
+              </a:lnSpc>
+            </a:pPr>
+            <a:r>
+              <a:rPr b="0" lang="en-IN" sz="3000" spc="-1" strike="noStrike">
+                <a:solidFill>
+                  <a:srgbClr val="2c0ee0"/>
+                </a:solidFill>
+                <a:uFill>
+                  <a:solidFill>
+                    <a:srgbClr val="ffffff"/>
+                  </a:solidFill>
+                </a:uFill>
+                <a:latin typeface="Times New Roman"/>
+                <a:ea typeface="Times New Roman"/>
+              </a:rPr>
+              <a:t>Where are we : </a:t>
+            </a:r>
+            <a:endParaRPr b="0" lang="en-IN" sz="1800" spc="-1" strike="noStrike">
+              <a:solidFill>
+                <a:srgbClr val="000000"/>
+              </a:solidFill>
+              <a:uFill>
+                <a:solidFill>
+                  <a:srgbClr val="ffffff"/>
+                </a:solidFill>
+              </a:uFill>
+              <a:latin typeface="Arial"/>
+            </a:endParaRPr>
+          </a:p>
+          <a:p>
+            <a:pPr>
+              <a:lnSpc>
+                <a:spcPct val="100000"/>
+              </a:lnSpc>
+            </a:pPr>
+            <a:endParaRPr b="0" lang="en-IN" sz="1800" spc="-1" strike="noStrike">
+              <a:solidFill>
+                <a:srgbClr val="000000"/>
+              </a:solidFill>
+              <a:uFill>
+                <a:solidFill>
+                  <a:srgbClr val="ffffff"/>
+                </a:solidFill>
+              </a:uFill>
+              <a:latin typeface="Arial"/>
+            </a:endParaRPr>
+          </a:p>
+          <a:p>
+            <a:pPr>
+              <a:lnSpc>
+                <a:spcPct val="100000"/>
+              </a:lnSpc>
+            </a:pPr>
+            <a:r>
+              <a:rPr b="0" lang="en-IN" sz="3000" spc="-1" strike="noStrike">
+                <a:solidFill>
+                  <a:srgbClr val="2c0ee0"/>
+                </a:solidFill>
+                <a:uFill>
+                  <a:solidFill>
+                    <a:srgbClr val="ffffff"/>
+                  </a:solidFill>
+                </a:uFill>
+                <a:latin typeface="Times New Roman"/>
+                <a:ea typeface="Times New Roman"/>
+              </a:rPr>
+              <a:t>Writing the own code of segnet from scratch in tensorflow. It should be done in 2 to 3 days. </a:t>
+            </a:r>
+            <a:endParaRPr b="0" lang="en-IN" sz="1800" spc="-1" strike="noStrike">
+              <a:solidFill>
+                <a:srgbClr val="000000"/>
+              </a:solidFill>
+              <a:uFill>
+                <a:solidFill>
+                  <a:srgbClr val="ffffff"/>
+                </a:solidFill>
+              </a:uFill>
+              <a:latin typeface="Arial"/>
+            </a:endParaRPr>
+          </a:p>
+          <a:p>
+            <a:pPr>
+              <a:lnSpc>
+                <a:spcPct val="100000"/>
+              </a:lnSpc>
+            </a:pPr>
+            <a:endParaRPr b="0" lang="en-IN" sz="1800" spc="-1" strike="noStrike">
+              <a:solidFill>
+                <a:srgbClr val="000000"/>
+              </a:solidFill>
+              <a:uFill>
+                <a:solidFill>
+                  <a:srgbClr val="ffffff"/>
+                </a:solidFill>
+              </a:uFill>
+              <a:latin typeface="Arial"/>
+            </a:endParaRPr>
+          </a:p>
+          <a:p>
+            <a:pPr>
+              <a:lnSpc>
+                <a:spcPct val="100000"/>
+              </a:lnSpc>
+            </a:pPr>
+            <a:r>
+              <a:rPr b="0" lang="en-IN" sz="3000" spc="-1" strike="noStrike">
+                <a:solidFill>
+                  <a:srgbClr val="2c0ee0"/>
+                </a:solidFill>
+                <a:uFill>
+                  <a:solidFill>
+                    <a:srgbClr val="ffffff"/>
+                  </a:solidFill>
+                </a:uFill>
+                <a:latin typeface="Times New Roman"/>
+                <a:ea typeface="Times New Roman"/>
+              </a:rPr>
+              <a:t>Start studying abou unsupervised deep learning.      </a:t>
+            </a:r>
+            <a:endParaRPr b="0" lang="en-IN" sz="1800" spc="-1" strike="noStrike">
+              <a:solidFill>
+                <a:srgbClr val="000000"/>
+              </a:solidFill>
+              <a:uFill>
+                <a:solidFill>
+                  <a:srgbClr val="ffffff"/>
+                </a:solidFill>
+              </a:uFill>
+              <a:latin typeface="Arial"/>
+            </a:endParaRPr>
+          </a:p>
+          <a:p>
+            <a:pPr>
+              <a:lnSpc>
+                <a:spcPct val="100000"/>
+              </a:lnSpc>
+            </a:pPr>
+            <a:endParaRPr b="0" lang="en-IN" sz="1800" spc="-1" strike="noStrike">
+              <a:solidFill>
+                <a:srgbClr val="000000"/>
+              </a:solidFill>
+              <a:uFill>
+                <a:solidFill>
+                  <a:srgbClr val="ffffff"/>
+                </a:solidFill>
+              </a:uFill>
+              <a:latin typeface="Arial"/>
+            </a:endParaRPr>
+          </a:p>
+          <a:p>
+            <a:pPr>
+              <a:lnSpc>
+                <a:spcPct val="100000"/>
+              </a:lnSpc>
+            </a:pPr>
+            <a:endParaRPr b="0" lang="en-IN" sz="1800" spc="-1" strike="noStrike">
+              <a:solidFill>
+                <a:srgbClr val="000000"/>
+              </a:solidFill>
+              <a:uFill>
+                <a:solidFill>
+                  <a:srgbClr val="ffffff"/>
+                </a:solidFill>
+              </a:uFill>
+              <a:latin typeface="Arial"/>
+            </a:endParaRPr>
+          </a:p>
+          <a:p>
+            <a:pPr>
+              <a:lnSpc>
+                <a:spcPct val="100000"/>
+              </a:lnSpc>
+            </a:pPr>
+            <a:endParaRPr b="0" lang="en-IN" sz="1800" spc="-1" strike="noStrike">
+              <a:solidFill>
+                <a:srgbClr val="000000"/>
+              </a:solidFill>
+              <a:uFill>
+                <a:solidFill>
+                  <a:srgbClr val="ffffff"/>
+                </a:solidFill>
+              </a:uFill>
+              <a:latin typeface="Arial"/>
+            </a:endParaRPr>
+          </a:p>
+          <a:p>
+            <a:pPr>
+              <a:lnSpc>
+                <a:spcPct val="100000"/>
+              </a:lnSpc>
+            </a:pPr>
+            <a:endParaRPr b="0" lang="en-IN" sz="1800" spc="-1" strike="noStrike">
+              <a:solidFill>
+                <a:srgbClr val="000000"/>
+              </a:solidFill>
+              <a:uFill>
+                <a:solidFill>
+                  <a:srgbClr val="ffffff"/>
+                </a:solidFill>
+              </a:uFill>
+              <a:latin typeface="Arial"/>
+            </a:endParaRPr>
+          </a:p>
+          <a:p>
+            <a:pPr>
+              <a:lnSpc>
+                <a:spcPct val="100000"/>
+              </a:lnSpc>
+            </a:pPr>
+            <a:endParaRPr b="0" lang="en-IN" sz="1800" spc="-1" strike="noStrike">
+              <a:solidFill>
+                <a:srgbClr val="000000"/>
+              </a:solidFill>
+              <a:uFill>
+                <a:solidFill>
+                  <a:srgbClr val="ffffff"/>
+                </a:solidFill>
+              </a:uFill>
+              <a:latin typeface="Arial"/>
+            </a:endParaRPr>
+          </a:p>
+          <a:p>
+            <a:pPr>
+              <a:lnSpc>
+                <a:spcPct val="100000"/>
+              </a:lnSpc>
+            </a:pPr>
+            <a:endParaRPr b="0" lang="en-IN" sz="1800" spc="-1" strike="noStrike">
+              <a:solidFill>
+                <a:srgbClr val="000000"/>
+              </a:solidFill>
+              <a:uFill>
+                <a:solidFill>
+                  <a:srgbClr val="ffffff"/>
+                </a:solidFill>
+              </a:uFill>
+              <a:latin typeface="Arial"/>
+            </a:endParaRPr>
+          </a:p>
+          <a:p>
+            <a:pPr>
+              <a:lnSpc>
+                <a:spcPct val="100000"/>
+              </a:lnSpc>
+            </a:pPr>
+            <a:endParaRPr b="0" lang="en-IN" sz="1800" spc="-1" strike="noStrike">
+              <a:solidFill>
+                <a:srgbClr val="000000"/>
+              </a:solidFill>
+              <a:uFill>
+                <a:solidFill>
+                  <a:srgbClr val="ffffff"/>
+                </a:solidFill>
+              </a:uFill>
+              <a:latin typeface="Arial"/>
+            </a:endParaRPr>
+          </a:p>
+          <a:p>
+            <a:pPr>
+              <a:lnSpc>
+                <a:spcPct val="100000"/>
+              </a:lnSpc>
+            </a:pPr>
+            <a:endParaRPr b="0" lang="en-IN" sz="1800" spc="-1" strike="noStrike">
+              <a:solidFill>
+                <a:srgbClr val="000000"/>
+              </a:solidFill>
+              <a:uFill>
+                <a:solidFill>
+                  <a:srgbClr val="ffffff"/>
+                </a:solidFill>
+              </a:uFill>
+              <a:latin typeface="Arial"/>
+            </a:endParaRPr>
+          </a:p>
+          <a:p>
+            <a:pPr>
+              <a:lnSpc>
+                <a:spcPct val="100000"/>
+              </a:lnSpc>
+            </a:pPr>
+            <a:r>
+              <a:rPr b="0" lang="en-IN" sz="3000" spc="-1" strike="noStrike">
+                <a:solidFill>
+                  <a:srgbClr val="2c0ee0"/>
+                </a:solidFill>
+                <a:uFill>
+                  <a:solidFill>
+                    <a:srgbClr val="ffffff"/>
+                  </a:solidFill>
+                </a:uFill>
+                <a:latin typeface="Times New Roman"/>
+                <a:ea typeface="Times New Roman"/>
+              </a:rPr>
+              <a:t> </a:t>
+            </a:r>
+            <a:endParaRPr b="0" lang="en-IN" sz="1800" spc="-1" strike="noStrike">
+              <a:solidFill>
+                <a:srgbClr val="000000"/>
+              </a:solidFill>
+              <a:uFill>
+                <a:solidFill>
+                  <a:srgbClr val="ffffff"/>
+                </a:solidFill>
+              </a:uFill>
+              <a:latin typeface="Arial"/>
+            </a:endParaRPr>
+          </a:p>
+        </p:txBody>
+      </p:sp>
+      <p:sp>
+        <p:nvSpPr>
+          <p:cNvPr id="88" name="CustomShape 2"/>
+          <p:cNvSpPr/>
+          <p:nvPr/>
+        </p:nvSpPr>
+        <p:spPr>
+          <a:xfrm>
+            <a:off x="288000" y="4597920"/>
+            <a:ext cx="8664480" cy="1881000"/>
+          </a:xfrm>
+          <a:prstGeom prst="rect">
+            <a:avLst/>
+          </a:prstGeom>
+          <a:noFill/>
+          <a:ln>
+            <a:noFill/>
+          </a:ln>
+        </p:spPr>
+        <p:style>
+          <a:lnRef idx="0"/>
+          <a:fillRef idx="0"/>
+          <a:effectRef idx="0"/>
+          <a:fontRef idx="minor"/>
+        </p:style>
+      </p:sp>
     </p:spTree>
   </p:cSld>
   <p:timing>
@@ -5097,6 +5683,78 @@
           <p:childTnLst>
             <p:seq>
               <p:cTn id="8" nodeType="mainSeq"/>
+              <p:prevCondLst>
+                <p:cond delay="0" evt="onPrev">
+                  <p:tgtEl>
+                    <p:sldTgt/>
+                  </p:tgtEl>
+                </p:cond>
+              </p:prevCondLst>
+              <p:nextCondLst>
+                <p:cond delay="0" evt="onNext">
+                  <p:tgtEl>
+                    <p:sldTgt/>
+                  </p:tgtEl>
+                </p:cond>
+              </p:nextCondLst>
+            </p:seq>
+          </p:childTnLst>
+        </p:cTn>
+      </p:par>
+    </p:tnLst>
+  </p:timing>
+</p:sld>
+</file>
+
+<file path=ppt/slides/slide5.xml><?xml version="1.0" encoding="utf-8"?>
+<p:sld xmlns:a="http://schemas.openxmlformats.org/drawingml/2006/main" xmlns:p="http://schemas.openxmlformats.org/presentationml/2006/main" xmlns:r="http://schemas.openxmlformats.org/officeDocument/2006/relationships" xmlns:p14="http://schemas.microsoft.com/office/powerpoint/2010/main" xmlns:p15="http://schemas.microsoft.com/office/powerpoint/2012/main" xmlns:mc="http://schemas.openxmlformats.org/markup-compatibility/2006">
+  <p:cSld>
+    <p:spTree>
+      <p:nvGrpSpPr>
+        <p:cNvPr id="1" name=""/>
+        <p:cNvGrpSpPr/>
+        <p:nvPr/>
+      </p:nvGrpSpPr>
+      <p:grpSpPr>
+        <a:xfrm>
+          <a:off x="0" y="0"/>
+          <a:ext cx="0" cy="0"/>
+          <a:chOff x="0" y="0"/>
+          <a:chExt cx="0" cy="0"/>
+        </a:xfrm>
+      </p:grpSpPr>
+      <p:pic>
+        <p:nvPicPr>
+          <p:cNvPr id="89" name="Google Shape;178;p13" descr=""/>
+          <p:cNvPicPr/>
+          <p:nvPr/>
+        </p:nvPicPr>
+        <p:blipFill>
+          <a:blip r:embed="rId1"/>
+          <a:stretch/>
+        </p:blipFill>
+        <p:spPr>
+          <a:xfrm>
+            <a:off x="2205000" y="1652760"/>
+            <a:ext cx="4732200" cy="3551040"/>
+          </a:xfrm>
+          <a:prstGeom prst="rect">
+            <a:avLst/>
+          </a:prstGeom>
+          <a:ln>
+            <a:noFill/>
+          </a:ln>
+        </p:spPr>
+      </p:pic>
+    </p:spTree>
+  </p:cSld>
+  <p:timing>
+    <p:tnLst>
+      <p:par>
+        <p:cTn id="9" dur="indefinite" restart="never" nodeType="tmRoot">
+          <p:childTnLst>
+            <p:seq>
+              <p:cTn id="10" nodeType="mainSeq"/>
               <p:prevCondLst>
                 <p:cond delay="0" evt="onPrev">
                   <p:tgtEl>

</xml_diff>